<commit_message>
thurs push presentation updated
</commit_message>
<xml_diff>
--- a/Presentation/nick_forte_capstone.pptx
+++ b/Presentation/nick_forte_capstone.pptx
@@ -5,7 +5,7 @@
     <p:sldMasterId id="2147483648" r:id="rId1"/>
   </p:sldMasterIdLst>
   <p:notesMasterIdLst>
-    <p:notesMasterId r:id="rId23"/>
+    <p:notesMasterId r:id="rId24"/>
   </p:notesMasterIdLst>
   <p:sldIdLst>
     <p:sldId id="320" r:id="rId2"/>
@@ -22,13 +22,14 @@
     <p:sldId id="301" r:id="rId13"/>
     <p:sldId id="318" r:id="rId14"/>
     <p:sldId id="317" r:id="rId15"/>
-    <p:sldId id="300" r:id="rId16"/>
-    <p:sldId id="303" r:id="rId17"/>
-    <p:sldId id="322" r:id="rId18"/>
-    <p:sldId id="323" r:id="rId19"/>
-    <p:sldId id="314" r:id="rId20"/>
-    <p:sldId id="311" r:id="rId21"/>
-    <p:sldId id="312" r:id="rId22"/>
+    <p:sldId id="328" r:id="rId16"/>
+    <p:sldId id="300" r:id="rId17"/>
+    <p:sldId id="303" r:id="rId18"/>
+    <p:sldId id="322" r:id="rId19"/>
+    <p:sldId id="323" r:id="rId20"/>
+    <p:sldId id="314" r:id="rId21"/>
+    <p:sldId id="311" r:id="rId22"/>
+    <p:sldId id="312" r:id="rId23"/>
   </p:sldIdLst>
   <p:sldSz cx="12192000" cy="6858000"/>
   <p:notesSz cx="6858000" cy="9144000"/>
@@ -3781,7 +3782,7 @@
                 </a:effectLst>
                 <a:latin typeface="Franklin Gothic Medium Cond" panose="020B0606030402020204" pitchFamily="34" charset="0"/>
               </a:rPr>
-              <a:t>Analysis of Split Ticket Voting in Tennessee Elections </a:t>
+              <a:t>Analysis of Ticket Splitting in Tennessee Elections </a:t>
             </a:r>
           </a:p>
           <a:p>
@@ -3815,11 +3816,11 @@
   <p:clrMapOvr>
     <a:masterClrMapping/>
   </p:clrMapOvr>
-  <mc:AlternateContent xmlns:mc="http://schemas.openxmlformats.org/markup-compatibility/2006">
-    <mc:Choice xmlns:p14="http://schemas.microsoft.com/office/powerpoint/2010/main" Requires="p14">
+  <mc:AlternateContent xmlns:mc="http://schemas.openxmlformats.org/markup-compatibility/2006" xmlns:p14="http://schemas.microsoft.com/office/powerpoint/2010/main">
+    <mc:Choice Requires="p14">
       <p:transition p14:dur="0" advTm="0"/>
     </mc:Choice>
-    <mc:Fallback>
+    <mc:Fallback xmlns="">
       <p:transition advTm="0"/>
     </mc:Fallback>
   </mc:AlternateContent>
@@ -4193,12 +4194,12 @@
           </a:prstGeom>
           <a:gradFill flip="none" rotWithShape="1">
             <a:gsLst>
-              <a:gs pos="60000">
+              <a:gs pos="67000">
                 <a:schemeClr val="accent4">
                   <a:lumMod val="67000"/>
                 </a:schemeClr>
               </a:gs>
-              <a:gs pos="86000">
+              <a:gs pos="87000">
                 <a:schemeClr val="accent4">
                   <a:lumMod val="97000"/>
                   <a:lumOff val="3000"/>
@@ -4319,12 +4320,12 @@
       <p:bgPr>
         <a:gradFill flip="none" rotWithShape="1">
           <a:gsLst>
-            <a:gs pos="0">
+            <a:gs pos="59000">
               <a:schemeClr val="accent4">
                 <a:lumMod val="67000"/>
               </a:schemeClr>
             </a:gs>
-            <a:gs pos="48000">
+            <a:gs pos="89000">
               <a:schemeClr val="accent4">
                 <a:lumMod val="97000"/>
                 <a:lumOff val="3000"/>
@@ -4375,8 +4376,8 @@
         </p:nvSpPr>
         <p:spPr>
           <a:xfrm>
-            <a:off x="838200" y="2665282"/>
-            <a:ext cx="10515600" cy="1173387"/>
+            <a:off x="1424412" y="2842305"/>
+            <a:ext cx="9343176" cy="1173387"/>
           </a:xfrm>
         </p:spPr>
         <p:txBody>
@@ -4407,6 +4408,58 @@
           </a:p>
         </p:txBody>
       </p:sp>
+      <p:sp>
+        <p:nvSpPr>
+          <p:cNvPr id="4" name="Rectangle 3">
+            <a:extLst>
+              <a:ext uri="{FF2B5EF4-FFF2-40B4-BE49-F238E27FC236}">
+                <a16:creationId xmlns:a16="http://schemas.microsoft.com/office/drawing/2014/main" id="{E07CDCE0-8238-4E5F-9304-9C74222CBA02}"/>
+              </a:ext>
+            </a:extLst>
+          </p:cNvPr>
+          <p:cNvSpPr/>
+          <p:nvPr/>
+        </p:nvSpPr>
+        <p:spPr>
+          <a:xfrm>
+            <a:off x="1275030" y="1717894"/>
+            <a:ext cx="9641940" cy="3422210"/>
+          </a:xfrm>
+          <a:prstGeom prst="rect">
+            <a:avLst/>
+          </a:prstGeom>
+          <a:noFill/>
+          <a:ln w="28575">
+            <a:solidFill>
+              <a:schemeClr val="bg1"/>
+            </a:solidFill>
+          </a:ln>
+        </p:spPr>
+        <p:style>
+          <a:lnRef idx="2">
+            <a:schemeClr val="accent1">
+              <a:shade val="50000"/>
+            </a:schemeClr>
+          </a:lnRef>
+          <a:fillRef idx="1">
+            <a:schemeClr val="accent1"/>
+          </a:fillRef>
+          <a:effectRef idx="0">
+            <a:schemeClr val="accent1"/>
+          </a:effectRef>
+          <a:fontRef idx="minor">
+            <a:schemeClr val="lt1"/>
+          </a:fontRef>
+        </p:style>
+        <p:txBody>
+          <a:bodyPr rtlCol="0" anchor="ctr"/>
+          <a:lstStyle/>
+          <a:p>
+            <a:pPr algn="ctr"/>
+            <a:endParaRPr lang="en-US"/>
+          </a:p>
+        </p:txBody>
+      </p:sp>
     </p:spTree>
     <p:extLst>
       <p:ext uri="{BB962C8B-B14F-4D97-AF65-F5344CB8AC3E}">
@@ -4417,13 +4470,13 @@
   <p:clrMapOvr>
     <a:masterClrMapping/>
   </p:clrMapOvr>
-  <mc:AlternateContent xmlns:mc="http://schemas.openxmlformats.org/markup-compatibility/2006">
-    <mc:Choice xmlns:p14="http://schemas.microsoft.com/office/powerpoint/2010/main" Requires="p14">
+  <mc:AlternateContent xmlns:mc="http://schemas.openxmlformats.org/markup-compatibility/2006" xmlns:p14="http://schemas.microsoft.com/office/powerpoint/2010/main">
+    <mc:Choice Requires="p14">
       <p:transition spd="slow" p14:dur="1500" advTm="0">
         <p:random/>
       </p:transition>
     </mc:Choice>
-    <mc:Fallback>
+    <mc:Fallback xmlns="">
       <p:transition spd="slow" advTm="0">
         <p:random/>
       </p:transition>
@@ -4906,7 +4959,7 @@
           </a:prstGeom>
           <a:gradFill flip="none" rotWithShape="1">
             <a:gsLst>
-              <a:gs pos="34000">
+              <a:gs pos="65000">
                 <a:schemeClr val="accent4">
                   <a:lumMod val="67000"/>
                 </a:schemeClr>
@@ -5953,6 +6006,178 @@
       <p:bgPr>
         <a:gradFill flip="none" rotWithShape="1">
           <a:gsLst>
+            <a:gs pos="55000">
+              <a:schemeClr val="accent4">
+                <a:lumMod val="67000"/>
+              </a:schemeClr>
+            </a:gs>
+            <a:gs pos="87000">
+              <a:schemeClr val="accent4">
+                <a:lumMod val="97000"/>
+                <a:lumOff val="3000"/>
+              </a:schemeClr>
+            </a:gs>
+            <a:gs pos="100000">
+              <a:schemeClr val="accent4">
+                <a:lumMod val="60000"/>
+                <a:lumOff val="40000"/>
+              </a:schemeClr>
+            </a:gs>
+          </a:gsLst>
+          <a:lin ang="16200000" scaled="1"/>
+          <a:tileRect/>
+        </a:gradFill>
+        <a:effectLst/>
+      </p:bgPr>
+    </p:bg>
+    <p:spTree>
+      <p:nvGrpSpPr>
+        <p:cNvPr id="1" name=""/>
+        <p:cNvGrpSpPr/>
+        <p:nvPr/>
+      </p:nvGrpSpPr>
+      <p:grpSpPr>
+        <a:xfrm>
+          <a:off x="0" y="0"/>
+          <a:ext cx="0" cy="0"/>
+          <a:chOff x="0" y="0"/>
+          <a:chExt cx="0" cy="0"/>
+        </a:xfrm>
+      </p:grpSpPr>
+      <p:sp>
+        <p:nvSpPr>
+          <p:cNvPr id="3" name="Content Placeholder 2">
+            <a:extLst>
+              <a:ext uri="{FF2B5EF4-FFF2-40B4-BE49-F238E27FC236}">
+                <a16:creationId xmlns:a16="http://schemas.microsoft.com/office/drawing/2014/main" id="{54CE8B9A-F703-4547-B8D5-E0ACD9B4B20F}"/>
+              </a:ext>
+            </a:extLst>
+          </p:cNvPr>
+          <p:cNvSpPr>
+            <a:spLocks noGrp="1"/>
+          </p:cNvSpPr>
+          <p:nvPr>
+            <p:ph idx="1"/>
+          </p:nvPr>
+        </p:nvSpPr>
+        <p:spPr>
+          <a:xfrm>
+            <a:off x="1972146" y="2582837"/>
+            <a:ext cx="8247707" cy="1692323"/>
+          </a:xfrm>
+        </p:spPr>
+        <p:txBody>
+          <a:bodyPr>
+            <a:normAutofit/>
+          </a:bodyPr>
+          <a:lstStyle/>
+          <a:p>
+            <a:pPr marL="0" indent="0" algn="ctr">
+              <a:buNone/>
+            </a:pPr>
+            <a:r>
+              <a:rPr lang="en-US" sz="4800" b="1" dirty="0">
+                <a:solidFill>
+                  <a:schemeClr val="bg1"/>
+                </a:solidFill>
+                <a:effectLst>
+                  <a:outerShdw blurRad="38100" dist="38100" dir="2700000" algn="tl">
+                    <a:srgbClr val="000000">
+                      <a:alpha val="43137"/>
+                    </a:srgbClr>
+                  </a:outerShdw>
+                </a:effectLst>
+                <a:latin typeface="Franklin Gothic Medium Cond" panose="020B0606030402020204" pitchFamily="34" charset="0"/>
+              </a:rPr>
+              <a:t>Are voters more likely to split their ticket depending on the office?</a:t>
+            </a:r>
+          </a:p>
+        </p:txBody>
+      </p:sp>
+      <p:sp>
+        <p:nvSpPr>
+          <p:cNvPr id="4" name="Rectangle 3">
+            <a:extLst>
+              <a:ext uri="{FF2B5EF4-FFF2-40B4-BE49-F238E27FC236}">
+                <a16:creationId xmlns:a16="http://schemas.microsoft.com/office/drawing/2014/main" id="{62E020A6-621F-4A19-B775-B56DAB1E34B3}"/>
+              </a:ext>
+            </a:extLst>
+          </p:cNvPr>
+          <p:cNvSpPr/>
+          <p:nvPr/>
+        </p:nvSpPr>
+        <p:spPr>
+          <a:xfrm>
+            <a:off x="1275030" y="1717894"/>
+            <a:ext cx="9641940" cy="3422210"/>
+          </a:xfrm>
+          <a:prstGeom prst="rect">
+            <a:avLst/>
+          </a:prstGeom>
+          <a:noFill/>
+          <a:ln w="28575">
+            <a:solidFill>
+              <a:schemeClr val="bg1"/>
+            </a:solidFill>
+          </a:ln>
+        </p:spPr>
+        <p:style>
+          <a:lnRef idx="2">
+            <a:schemeClr val="accent1">
+              <a:shade val="50000"/>
+            </a:schemeClr>
+          </a:lnRef>
+          <a:fillRef idx="1">
+            <a:schemeClr val="accent1"/>
+          </a:fillRef>
+          <a:effectRef idx="0">
+            <a:schemeClr val="accent1"/>
+          </a:effectRef>
+          <a:fontRef idx="minor">
+            <a:schemeClr val="lt1"/>
+          </a:fontRef>
+        </p:style>
+        <p:txBody>
+          <a:bodyPr rtlCol="0" anchor="ctr"/>
+          <a:lstStyle/>
+          <a:p>
+            <a:pPr algn="ctr"/>
+            <a:endParaRPr lang="en-US"/>
+          </a:p>
+        </p:txBody>
+      </p:sp>
+    </p:spTree>
+    <p:extLst>
+      <p:ext uri="{BB962C8B-B14F-4D97-AF65-F5344CB8AC3E}">
+        <p14:creationId xmlns:p14="http://schemas.microsoft.com/office/powerpoint/2010/main" val="122313978"/>
+      </p:ext>
+    </p:extLst>
+  </p:cSld>
+  <p:clrMapOvr>
+    <a:masterClrMapping/>
+  </p:clrMapOvr>
+  <mc:AlternateContent xmlns:mc="http://schemas.openxmlformats.org/markup-compatibility/2006">
+    <mc:Choice xmlns:p14="http://schemas.microsoft.com/office/powerpoint/2010/main" Requires="p14">
+      <p:transition spd="slow" p14:dur="1500" advTm="0">
+        <p:random/>
+      </p:transition>
+    </mc:Choice>
+    <mc:Fallback>
+      <p:transition spd="slow" advTm="0">
+        <p:random/>
+      </p:transition>
+    </mc:Fallback>
+  </mc:AlternateContent>
+</p:sld>
+</file>
+
+<file path=ppt/slides/slide16.xml><?xml version="1.0" encoding="utf-8"?>
+<p:sld xmlns:a="http://schemas.openxmlformats.org/drawingml/2006/main" xmlns:r="http://schemas.openxmlformats.org/officeDocument/2006/relationships" xmlns:p="http://schemas.openxmlformats.org/presentationml/2006/main">
+  <p:cSld>
+    <p:bg>
+      <p:bgPr>
+        <a:gradFill flip="none" rotWithShape="1">
+          <a:gsLst>
             <a:gs pos="0">
               <a:schemeClr val="accent4">
                 <a:lumMod val="5000"/>
@@ -6254,12 +6479,12 @@
           </a:prstGeom>
           <a:gradFill flip="none" rotWithShape="1">
             <a:gsLst>
-              <a:gs pos="48000">
+              <a:gs pos="72000">
                 <a:schemeClr val="accent4">
                   <a:lumMod val="67000"/>
                 </a:schemeClr>
               </a:gs>
-              <a:gs pos="80000">
+              <a:gs pos="86000">
                 <a:schemeClr val="accent4">
                   <a:lumMod val="97000"/>
                   <a:lumOff val="3000"/>
@@ -6637,7 +6862,7 @@
 </p:sld>
 </file>
 
-<file path=ppt/slides/slide16.xml><?xml version="1.0" encoding="utf-8"?>
+<file path=ppt/slides/slide17.xml><?xml version="1.0" encoding="utf-8"?>
 <p:sld xmlns:a="http://schemas.openxmlformats.org/drawingml/2006/main" xmlns:r="http://schemas.openxmlformats.org/officeDocument/2006/relationships" xmlns:p="http://schemas.openxmlformats.org/presentationml/2006/main">
   <p:cSld>
     <p:spTree>
@@ -7012,7 +7237,7 @@
           </a:prstGeom>
           <a:gradFill flip="none" rotWithShape="1">
             <a:gsLst>
-              <a:gs pos="33000">
+              <a:gs pos="57000">
                 <a:schemeClr val="accent4">
                   <a:lumMod val="67000"/>
                 </a:schemeClr>
@@ -7302,7 +7527,7 @@
 </p:sld>
 </file>
 
-<file path=ppt/slides/slide17.xml><?xml version="1.0" encoding="utf-8"?>
+<file path=ppt/slides/slide18.xml><?xml version="1.0" encoding="utf-8"?>
 <p:sld xmlns:a="http://schemas.openxmlformats.org/drawingml/2006/main" xmlns:r="http://schemas.openxmlformats.org/officeDocument/2006/relationships" xmlns:p="http://schemas.openxmlformats.org/presentationml/2006/main">
   <p:cSld>
     <p:spTree>
@@ -7956,30 +8181,30 @@
   <p:clrMapOvr>
     <a:masterClrMapping/>
   </p:clrMapOvr>
-  <mc:AlternateContent xmlns:mc="http://schemas.openxmlformats.org/markup-compatibility/2006">
-    <mc:Choice xmlns:p14="http://schemas.microsoft.com/office/powerpoint/2010/main" Requires="p14">
+  <mc:AlternateContent xmlns:mc="http://schemas.openxmlformats.org/markup-compatibility/2006" xmlns:p14="http://schemas.microsoft.com/office/powerpoint/2010/main">
+    <mc:Choice Requires="p14">
       <p:transition p14:dur="0" advTm="0"/>
     </mc:Choice>
-    <mc:Fallback>
+    <mc:Fallback xmlns="">
       <p:transition advTm="0"/>
     </mc:Fallback>
   </mc:AlternateContent>
 </p:sld>
 </file>
 
-<file path=ppt/slides/slide18.xml><?xml version="1.0" encoding="utf-8"?>
+<file path=ppt/slides/slide19.xml><?xml version="1.0" encoding="utf-8"?>
 <p:sld xmlns:a="http://schemas.openxmlformats.org/drawingml/2006/main" xmlns:r="http://schemas.openxmlformats.org/officeDocument/2006/relationships" xmlns:p="http://schemas.openxmlformats.org/presentationml/2006/main">
   <p:cSld>
     <p:bg>
       <p:bgPr>
         <a:gradFill flip="none" rotWithShape="1">
           <a:gsLst>
-            <a:gs pos="26000">
+            <a:gs pos="55000">
               <a:schemeClr val="accent4">
                 <a:lumMod val="67000"/>
               </a:schemeClr>
             </a:gs>
-            <a:gs pos="80000">
+            <a:gs pos="87000">
               <a:schemeClr val="accent4">
                 <a:lumMod val="97000"/>
                 <a:lumOff val="3000"/>
@@ -8030,8 +8255,8 @@
         </p:nvSpPr>
         <p:spPr>
           <a:xfrm>
-            <a:off x="838200" y="2417951"/>
-            <a:ext cx="10515600" cy="2022098"/>
+            <a:off x="1972146" y="2582837"/>
+            <a:ext cx="8247707" cy="1692323"/>
           </a:xfrm>
         </p:spPr>
         <p:txBody>
@@ -8044,7 +8269,7 @@
               <a:buNone/>
             </a:pPr>
             <a:r>
-              <a:rPr lang="en-US" sz="6000" b="1" dirty="0">
+              <a:rPr lang="en-US" sz="4800" b="1" dirty="0">
                 <a:solidFill>
                   <a:schemeClr val="bg1"/>
                 </a:solidFill>
@@ -8057,8 +8282,81 @@
                 </a:effectLst>
                 <a:latin typeface="Franklin Gothic Medium Cond" panose="020B0606030402020204" pitchFamily="34" charset="0"/>
               </a:rPr>
-              <a:t>Are certain demographics more likely to split their ticket?</a:t>
-            </a:r>
+              <a:t>Are certain demographics more </a:t>
+            </a:r>
+          </a:p>
+          <a:p>
+            <a:pPr marL="0" indent="0" algn="ctr">
+              <a:buNone/>
+            </a:pPr>
+            <a:r>
+              <a:rPr lang="en-US" sz="4800" b="1" dirty="0">
+                <a:solidFill>
+                  <a:schemeClr val="bg1"/>
+                </a:solidFill>
+                <a:effectLst>
+                  <a:outerShdw blurRad="38100" dist="38100" dir="2700000" algn="tl">
+                    <a:srgbClr val="000000">
+                      <a:alpha val="43137"/>
+                    </a:srgbClr>
+                  </a:outerShdw>
+                </a:effectLst>
+                <a:latin typeface="Franklin Gothic Medium Cond" panose="020B0606030402020204" pitchFamily="34" charset="0"/>
+              </a:rPr>
+              <a:t>likely to split their ticket?</a:t>
+            </a:r>
+          </a:p>
+        </p:txBody>
+      </p:sp>
+      <p:sp>
+        <p:nvSpPr>
+          <p:cNvPr id="4" name="Rectangle 3">
+            <a:extLst>
+              <a:ext uri="{FF2B5EF4-FFF2-40B4-BE49-F238E27FC236}">
+                <a16:creationId xmlns:a16="http://schemas.microsoft.com/office/drawing/2014/main" id="{62E020A6-621F-4A19-B775-B56DAB1E34B3}"/>
+              </a:ext>
+            </a:extLst>
+          </p:cNvPr>
+          <p:cNvSpPr/>
+          <p:nvPr/>
+        </p:nvSpPr>
+        <p:spPr>
+          <a:xfrm>
+            <a:off x="1275030" y="1717894"/>
+            <a:ext cx="9641940" cy="3422210"/>
+          </a:xfrm>
+          <a:prstGeom prst="rect">
+            <a:avLst/>
+          </a:prstGeom>
+          <a:noFill/>
+          <a:ln w="28575">
+            <a:solidFill>
+              <a:schemeClr val="bg1"/>
+            </a:solidFill>
+          </a:ln>
+        </p:spPr>
+        <p:style>
+          <a:lnRef idx="2">
+            <a:schemeClr val="accent1">
+              <a:shade val="50000"/>
+            </a:schemeClr>
+          </a:lnRef>
+          <a:fillRef idx="1">
+            <a:schemeClr val="accent1"/>
+          </a:fillRef>
+          <a:effectRef idx="0">
+            <a:schemeClr val="accent1"/>
+          </a:effectRef>
+          <a:fontRef idx="minor">
+            <a:schemeClr val="lt1"/>
+          </a:fontRef>
+        </p:style>
+        <p:txBody>
+          <a:bodyPr rtlCol="0" anchor="ctr"/>
+          <a:lstStyle/>
+          <a:p>
+            <a:pPr algn="ctr"/>
+            <a:endParaRPr lang="en-US"/>
           </a:p>
         </p:txBody>
       </p:sp>
@@ -8087,176 +8385,6 @@
 </p:sld>
 </file>
 
-<file path=ppt/slides/slide19.xml><?xml version="1.0" encoding="utf-8"?>
-<p:sld xmlns:a="http://schemas.openxmlformats.org/drawingml/2006/main" xmlns:r="http://schemas.openxmlformats.org/officeDocument/2006/relationships" xmlns:p="http://schemas.openxmlformats.org/presentationml/2006/main">
-  <p:cSld>
-    <p:bg>
-      <p:bgPr>
-        <a:gradFill flip="none" rotWithShape="1">
-          <a:gsLst>
-            <a:gs pos="22000">
-              <a:schemeClr val="accent4">
-                <a:lumMod val="0"/>
-                <a:lumOff val="100000"/>
-              </a:schemeClr>
-            </a:gs>
-            <a:gs pos="31000">
-              <a:schemeClr val="accent4">
-                <a:lumMod val="0"/>
-                <a:lumOff val="100000"/>
-              </a:schemeClr>
-            </a:gs>
-            <a:gs pos="100000">
-              <a:schemeClr val="accent4">
-                <a:lumMod val="100000"/>
-              </a:schemeClr>
-            </a:gs>
-          </a:gsLst>
-          <a:path path="circle">
-            <a:fillToRect l="50000" t="-80000" r="50000" b="180000"/>
-          </a:path>
-          <a:tileRect/>
-        </a:gradFill>
-        <a:effectLst/>
-      </p:bgPr>
-    </p:bg>
-    <p:spTree>
-      <p:nvGrpSpPr>
-        <p:cNvPr id="1" name=""/>
-        <p:cNvGrpSpPr/>
-        <p:nvPr/>
-      </p:nvGrpSpPr>
-      <p:grpSpPr>
-        <a:xfrm>
-          <a:off x="0" y="0"/>
-          <a:ext cx="0" cy="0"/>
-          <a:chOff x="0" y="0"/>
-          <a:chExt cx="0" cy="0"/>
-        </a:xfrm>
-      </p:grpSpPr>
-      <p:pic>
-        <p:nvPicPr>
-          <p:cNvPr id="10" name="Picture 9" descr="Table&#10;&#10;Description automatically generated">
-            <a:extLst>
-              <a:ext uri="{FF2B5EF4-FFF2-40B4-BE49-F238E27FC236}">
-                <a16:creationId xmlns:a16="http://schemas.microsoft.com/office/drawing/2014/main" id="{7917572A-26A7-41DF-953C-C187A37C5B01}"/>
-              </a:ext>
-            </a:extLst>
-          </p:cNvPr>
-          <p:cNvPicPr>
-            <a:picLocks noChangeAspect="1"/>
-          </p:cNvPicPr>
-          <p:nvPr/>
-        </p:nvPicPr>
-        <p:blipFill>
-          <a:blip r:embed="rId2">
-            <a:extLst>
-              <a:ext uri="{28A0092B-C50C-407E-A947-70E740481C1C}">
-                <a14:useLocalDpi xmlns:a14="http://schemas.microsoft.com/office/drawing/2010/main" val="0"/>
-              </a:ext>
-            </a:extLst>
-          </a:blip>
-          <a:stretch>
-            <a:fillRect/>
-          </a:stretch>
-        </p:blipFill>
-        <p:spPr>
-          <a:xfrm>
-            <a:off x="894812" y="1270390"/>
-            <a:ext cx="10402375" cy="1941483"/>
-          </a:xfrm>
-          <a:prstGeom prst="rect">
-            <a:avLst/>
-          </a:prstGeom>
-          <a:ln w="28575">
-            <a:solidFill>
-              <a:schemeClr val="tx1">
-                <a:lumMod val="95000"/>
-                <a:lumOff val="5000"/>
-              </a:schemeClr>
-            </a:solidFill>
-          </a:ln>
-          <a:effectLst>
-            <a:outerShdw blurRad="50800" dist="38100" dir="2700000" algn="tl" rotWithShape="0">
-              <a:prstClr val="black">
-                <a:alpha val="40000"/>
-              </a:prstClr>
-            </a:outerShdw>
-          </a:effectLst>
-        </p:spPr>
-      </p:pic>
-      <p:pic>
-        <p:nvPicPr>
-          <p:cNvPr id="13" name="Picture 12" descr="Diagram, table&#10;&#10;Description automatically generated">
-            <a:extLst>
-              <a:ext uri="{FF2B5EF4-FFF2-40B4-BE49-F238E27FC236}">
-                <a16:creationId xmlns:a16="http://schemas.microsoft.com/office/drawing/2014/main" id="{F34898C6-F72F-464D-B950-0C4A2AA97E8F}"/>
-              </a:ext>
-            </a:extLst>
-          </p:cNvPr>
-          <p:cNvPicPr>
-            <a:picLocks noChangeAspect="1"/>
-          </p:cNvPicPr>
-          <p:nvPr/>
-        </p:nvPicPr>
-        <p:blipFill>
-          <a:blip r:embed="rId3">
-            <a:extLst>
-              <a:ext uri="{28A0092B-C50C-407E-A947-70E740481C1C}">
-                <a14:useLocalDpi xmlns:a14="http://schemas.microsoft.com/office/drawing/2010/main" val="0"/>
-              </a:ext>
-            </a:extLst>
-          </a:blip>
-          <a:stretch>
-            <a:fillRect/>
-          </a:stretch>
-        </p:blipFill>
-        <p:spPr>
-          <a:xfrm>
-            <a:off x="894811" y="3646127"/>
-            <a:ext cx="10402376" cy="1941483"/>
-          </a:xfrm>
-          <a:prstGeom prst="rect">
-            <a:avLst/>
-          </a:prstGeom>
-          <a:ln w="28575">
-            <a:solidFill>
-              <a:schemeClr val="tx1">
-                <a:lumMod val="95000"/>
-                <a:lumOff val="5000"/>
-              </a:schemeClr>
-            </a:solidFill>
-          </a:ln>
-          <a:effectLst>
-            <a:outerShdw blurRad="50800" dist="38100" dir="2700000" algn="tl" rotWithShape="0">
-              <a:prstClr val="black">
-                <a:alpha val="40000"/>
-              </a:prstClr>
-            </a:outerShdw>
-          </a:effectLst>
-        </p:spPr>
-      </p:pic>
-    </p:spTree>
-    <p:extLst>
-      <p:ext uri="{BB962C8B-B14F-4D97-AF65-F5344CB8AC3E}">
-        <p14:creationId xmlns:p14="http://schemas.microsoft.com/office/powerpoint/2010/main" val="1659882562"/>
-      </p:ext>
-    </p:extLst>
-  </p:cSld>
-  <p:clrMapOvr>
-    <a:masterClrMapping/>
-  </p:clrMapOvr>
-  <mc:AlternateContent xmlns:mc="http://schemas.openxmlformats.org/markup-compatibility/2006" xmlns:p14="http://schemas.microsoft.com/office/powerpoint/2010/main">
-    <mc:Choice Requires="p14">
-      <p:transition p14:dur="0" advTm="0"/>
-    </mc:Choice>
-    <mc:Fallback xmlns="">
-      <p:transition advTm="0"/>
-    </mc:Fallback>
-  </mc:AlternateContent>
-</p:sld>
-</file>
-
 <file path=ppt/slides/slide2.xml><?xml version="1.0" encoding="utf-8"?>
 <p:sld xmlns:a="http://schemas.openxmlformats.org/drawingml/2006/main" xmlns:r="http://schemas.openxmlformats.org/officeDocument/2006/relationships" xmlns:p="http://schemas.openxmlformats.org/presentationml/2006/main">
   <p:cSld>
@@ -8264,12 +8392,12 @@
       <p:bgPr>
         <a:gradFill flip="none" rotWithShape="1">
           <a:gsLst>
-            <a:gs pos="20000">
+            <a:gs pos="51000">
               <a:schemeClr val="accent4">
                 <a:lumMod val="67000"/>
               </a:schemeClr>
             </a:gs>
-            <a:gs pos="73000">
+            <a:gs pos="86000">
               <a:schemeClr val="accent4">
                 <a:lumMod val="97000"/>
                 <a:lumOff val="3000"/>
@@ -8320,8 +8448,8 @@
         </p:nvSpPr>
         <p:spPr>
           <a:xfrm>
-            <a:off x="838200" y="2184486"/>
-            <a:ext cx="10515600" cy="2489027"/>
+            <a:off x="1628114" y="2420837"/>
+            <a:ext cx="8935771" cy="2016323"/>
           </a:xfrm>
         </p:spPr>
         <p:txBody>
@@ -8347,7 +8475,7 @@
                 </a:effectLst>
                 <a:latin typeface="Franklin Gothic Medium Cond" panose="020B0606030402020204" pitchFamily="34" charset="0"/>
               </a:rPr>
-              <a:t>What is Ticket Splitting? </a:t>
+              <a:t>What is ticket splitting? </a:t>
             </a:r>
           </a:p>
           <a:p>
@@ -8370,6 +8498,58 @@
               </a:rPr>
               <a:t>And how can we measure it?</a:t>
             </a:r>
+          </a:p>
+        </p:txBody>
+      </p:sp>
+      <p:sp>
+        <p:nvSpPr>
+          <p:cNvPr id="2" name="Rectangle 1">
+            <a:extLst>
+              <a:ext uri="{FF2B5EF4-FFF2-40B4-BE49-F238E27FC236}">
+                <a16:creationId xmlns:a16="http://schemas.microsoft.com/office/drawing/2014/main" id="{98322A6F-B418-4F04-A62F-14365F96587E}"/>
+              </a:ext>
+            </a:extLst>
+          </p:cNvPr>
+          <p:cNvSpPr/>
+          <p:nvPr/>
+        </p:nvSpPr>
+        <p:spPr>
+          <a:xfrm>
+            <a:off x="1275030" y="1717894"/>
+            <a:ext cx="9641940" cy="3422210"/>
+          </a:xfrm>
+          <a:prstGeom prst="rect">
+            <a:avLst/>
+          </a:prstGeom>
+          <a:noFill/>
+          <a:ln w="28575">
+            <a:solidFill>
+              <a:schemeClr val="bg1"/>
+            </a:solidFill>
+          </a:ln>
+        </p:spPr>
+        <p:style>
+          <a:lnRef idx="2">
+            <a:schemeClr val="accent1">
+              <a:shade val="50000"/>
+            </a:schemeClr>
+          </a:lnRef>
+          <a:fillRef idx="1">
+            <a:schemeClr val="accent1"/>
+          </a:fillRef>
+          <a:effectRef idx="0">
+            <a:schemeClr val="accent1"/>
+          </a:effectRef>
+          <a:fontRef idx="minor">
+            <a:schemeClr val="lt1"/>
+          </a:fontRef>
+        </p:style>
+        <p:txBody>
+          <a:bodyPr rtlCol="0" anchor="ctr"/>
+          <a:lstStyle/>
+          <a:p>
+            <a:pPr algn="ctr"/>
+            <a:endParaRPr lang="en-US"/>
           </a:p>
         </p:txBody>
       </p:sp>
@@ -8401,6 +8581,36 @@
 <file path=ppt/slides/slide20.xml><?xml version="1.0" encoding="utf-8"?>
 <p:sld xmlns:a="http://schemas.openxmlformats.org/drawingml/2006/main" xmlns:r="http://schemas.openxmlformats.org/officeDocument/2006/relationships" xmlns:p="http://schemas.openxmlformats.org/presentationml/2006/main">
   <p:cSld>
+    <p:bg>
+      <p:bgPr>
+        <a:gradFill flip="none" rotWithShape="1">
+          <a:gsLst>
+            <a:gs pos="31000">
+              <a:schemeClr val="accent4">
+                <a:lumMod val="0"/>
+                <a:lumOff val="100000"/>
+              </a:schemeClr>
+            </a:gs>
+            <a:gs pos="15000">
+              <a:schemeClr val="accent4">
+                <a:lumMod val="0"/>
+                <a:lumOff val="100000"/>
+              </a:schemeClr>
+            </a:gs>
+            <a:gs pos="80000">
+              <a:schemeClr val="accent4">
+                <a:lumMod val="100000"/>
+              </a:schemeClr>
+            </a:gs>
+          </a:gsLst>
+          <a:path path="circle">
+            <a:fillToRect l="50000" t="-80000" r="50000" b="180000"/>
+          </a:path>
+          <a:tileRect/>
+        </a:gradFill>
+        <a:effectLst/>
+      </p:bgPr>
+    </p:bg>
     <p:spTree>
       <p:nvGrpSpPr>
         <p:cNvPr id="1" name=""/>
@@ -8415,229 +8625,112 @@
           <a:chExt cx="0" cy="0"/>
         </a:xfrm>
       </p:grpSpPr>
-      <p:sp>
-        <p:nvSpPr>
-          <p:cNvPr id="5" name="Rectangle 4">
+      <p:pic>
+        <p:nvPicPr>
+          <p:cNvPr id="10" name="Picture 9" descr="Table&#10;&#10;Description automatically generated">
             <a:extLst>
               <a:ext uri="{FF2B5EF4-FFF2-40B4-BE49-F238E27FC236}">
-                <a16:creationId xmlns:a16="http://schemas.microsoft.com/office/drawing/2014/main" id="{84B400C4-BB0F-4859-AF5B-FB1A9B99FB98}"/>
+                <a16:creationId xmlns:a16="http://schemas.microsoft.com/office/drawing/2014/main" id="{7917572A-26A7-41DF-953C-C187A37C5B01}"/>
               </a:ext>
             </a:extLst>
           </p:cNvPr>
-          <p:cNvSpPr/>
+          <p:cNvPicPr>
+            <a:picLocks noChangeAspect="1"/>
+          </p:cNvPicPr>
           <p:nvPr/>
-        </p:nvSpPr>
-        <p:spPr>
-          <a:xfrm>
-            <a:off x="-1" y="-1"/>
-            <a:ext cx="12192001" cy="1032096"/>
+        </p:nvPicPr>
+        <p:blipFill>
+          <a:blip r:embed="rId2">
+            <a:extLst>
+              <a:ext uri="{28A0092B-C50C-407E-A947-70E740481C1C}">
+                <a14:useLocalDpi xmlns:a14="http://schemas.microsoft.com/office/drawing/2010/main" val="0"/>
+              </a:ext>
+            </a:extLst>
+          </a:blip>
+          <a:stretch>
+            <a:fillRect/>
+          </a:stretch>
+        </p:blipFill>
+        <p:spPr>
+          <a:xfrm>
+            <a:off x="894812" y="1197963"/>
+            <a:ext cx="10402375" cy="1941483"/>
           </a:xfrm>
           <a:prstGeom prst="rect">
             <a:avLst/>
           </a:prstGeom>
-          <a:gradFill flip="none" rotWithShape="1">
-            <a:gsLst>
-              <a:gs pos="54000">
-                <a:schemeClr val="accent4">
-                  <a:lumMod val="67000"/>
-                </a:schemeClr>
-              </a:gs>
-              <a:gs pos="91000">
-                <a:schemeClr val="accent4">
-                  <a:lumMod val="97000"/>
-                  <a:lumOff val="3000"/>
-                </a:schemeClr>
-              </a:gs>
-              <a:gs pos="100000">
-                <a:schemeClr val="accent4">
-                  <a:lumMod val="60000"/>
-                  <a:lumOff val="40000"/>
-                </a:schemeClr>
-              </a:gs>
-            </a:gsLst>
-            <a:lin ang="16200000" scaled="1"/>
-            <a:tileRect/>
-          </a:gradFill>
-          <a:ln>
-            <a:noFill/>
+          <a:ln w="28575">
+            <a:solidFill>
+              <a:schemeClr val="tx1">
+                <a:lumMod val="95000"/>
+                <a:lumOff val="5000"/>
+              </a:schemeClr>
+            </a:solidFill>
           </a:ln>
-        </p:spPr>
-        <p:style>
-          <a:lnRef idx="2">
-            <a:schemeClr val="accent1">
-              <a:shade val="50000"/>
-            </a:schemeClr>
-          </a:lnRef>
-          <a:fillRef idx="1">
-            <a:schemeClr val="accent1"/>
-          </a:fillRef>
-          <a:effectRef idx="0">
-            <a:schemeClr val="accent1"/>
-          </a:effectRef>
-          <a:fontRef idx="minor">
-            <a:schemeClr val="lt1"/>
-          </a:fontRef>
-        </p:style>
-        <p:txBody>
-          <a:bodyPr rtlCol="0" anchor="ctr"/>
-          <a:lstStyle/>
-          <a:p>
-            <a:pPr algn="ctr"/>
-            <a:endParaRPr lang="en-US"/>
-          </a:p>
-        </p:txBody>
-      </p:sp>
-      <p:sp>
-        <p:nvSpPr>
-          <p:cNvPr id="6" name="TextBox 5">
+          <a:effectLst>
+            <a:outerShdw blurRad="50800" dist="38100" dir="2700000" algn="tl" rotWithShape="0">
+              <a:prstClr val="black">
+                <a:alpha val="40000"/>
+              </a:prstClr>
+            </a:outerShdw>
+          </a:effectLst>
+        </p:spPr>
+      </p:pic>
+      <p:pic>
+        <p:nvPicPr>
+          <p:cNvPr id="13" name="Picture 12" descr="Diagram, table&#10;&#10;Description automatically generated">
             <a:extLst>
               <a:ext uri="{FF2B5EF4-FFF2-40B4-BE49-F238E27FC236}">
-                <a16:creationId xmlns:a16="http://schemas.microsoft.com/office/drawing/2014/main" id="{A697A704-88B5-4EF9-B920-4074EEEE0DC3}"/>
+                <a16:creationId xmlns:a16="http://schemas.microsoft.com/office/drawing/2014/main" id="{F34898C6-F72F-464D-B950-0C4A2AA97E8F}"/>
               </a:ext>
             </a:extLst>
           </p:cNvPr>
-          <p:cNvSpPr txBox="1"/>
+          <p:cNvPicPr>
+            <a:picLocks noChangeAspect="1"/>
+          </p:cNvPicPr>
           <p:nvPr/>
-        </p:nvSpPr>
-        <p:spPr>
-          <a:xfrm>
-            <a:off x="2900124" y="162104"/>
-            <a:ext cx="6391747" cy="707886"/>
+        </p:nvPicPr>
+        <p:blipFill>
+          <a:blip r:embed="rId3">
+            <a:extLst>
+              <a:ext uri="{28A0092B-C50C-407E-A947-70E740481C1C}">
+                <a14:useLocalDpi xmlns:a14="http://schemas.microsoft.com/office/drawing/2010/main" val="0"/>
+              </a:ext>
+            </a:extLst>
+          </a:blip>
+          <a:stretch>
+            <a:fillRect/>
+          </a:stretch>
+        </p:blipFill>
+        <p:spPr>
+          <a:xfrm>
+            <a:off x="894811" y="3718554"/>
+            <a:ext cx="10402376" cy="1941483"/>
           </a:xfrm>
           <a:prstGeom prst="rect">
             <a:avLst/>
           </a:prstGeom>
-          <a:noFill/>
-        </p:spPr>
-        <p:txBody>
-          <a:bodyPr wrap="square" rtlCol="0">
-            <a:spAutoFit/>
-          </a:bodyPr>
-          <a:lstStyle/>
-          <a:p>
-            <a:pPr algn="ctr"/>
-            <a:r>
-              <a:rPr lang="en-US" sz="4000" b="1" dirty="0">
-                <a:solidFill>
-                  <a:schemeClr val="bg1"/>
-                </a:solidFill>
-                <a:effectLst>
-                  <a:outerShdw blurRad="38100" dist="38100" dir="2700000" algn="tl">
-                    <a:srgbClr val="000000">
-                      <a:alpha val="43137"/>
-                    </a:srgbClr>
-                  </a:outerShdw>
-                </a:effectLst>
-                <a:latin typeface="Franklin Gothic Medium Cond" panose="020B0606030402020204" pitchFamily="34" charset="0"/>
-              </a:rPr>
-              <a:t>Conclusions</a:t>
-            </a:r>
-            <a:endParaRPr lang="en-US" b="1" dirty="0">
-              <a:solidFill>
-                <a:schemeClr val="bg1"/>
-              </a:solidFill>
-              <a:effectLst>
-                <a:outerShdw blurRad="38100" dist="38100" dir="2700000" algn="tl">
-                  <a:srgbClr val="000000">
-                    <a:alpha val="43137"/>
-                  </a:srgbClr>
-                </a:outerShdw>
-              </a:effectLst>
-              <a:latin typeface="Franklin Gothic Medium Cond" panose="020B0606030402020204" pitchFamily="34" charset="0"/>
-            </a:endParaRPr>
-          </a:p>
-        </p:txBody>
-      </p:sp>
-      <p:sp>
-        <p:nvSpPr>
-          <p:cNvPr id="7" name="TextBox 6">
-            <a:extLst>
-              <a:ext uri="{FF2B5EF4-FFF2-40B4-BE49-F238E27FC236}">
-                <a16:creationId xmlns:a16="http://schemas.microsoft.com/office/drawing/2014/main" id="{676BD517-F580-4B20-B9E6-EC1D9601F1C0}"/>
-              </a:ext>
-            </a:extLst>
-          </p:cNvPr>
-          <p:cNvSpPr txBox="1"/>
-          <p:nvPr/>
-        </p:nvSpPr>
-        <p:spPr>
-          <a:xfrm>
-            <a:off x="731820" y="1622172"/>
-            <a:ext cx="10728356" cy="4062651"/>
-          </a:xfrm>
-          <a:prstGeom prst="rect">
-            <a:avLst/>
-          </a:prstGeom>
-          <a:noFill/>
-        </p:spPr>
-        <p:txBody>
-          <a:bodyPr wrap="square" rtlCol="0">
-            <a:spAutoFit/>
-          </a:bodyPr>
-          <a:lstStyle/>
-          <a:p>
-            <a:pPr marL="285750" indent="-285750">
-              <a:buFont typeface="Wingdings" panose="05000000000000000000" pitchFamily="2" charset="2"/>
-              <a:buChar char="§"/>
-            </a:pPr>
-            <a:r>
-              <a:rPr lang="en-US" sz="2000" dirty="0">
-                <a:latin typeface="Franklin Gothic Medium Cond" panose="020B0606030402020204" pitchFamily="34" charset="0"/>
-              </a:rPr>
-              <a:t>Tennessee hasn’t split its statewide vote in any way since 2008, and based on recent trends it appears unlikely that it will anytime soon; Margin Range is decreasing as voters increasingly appear to be voting straight one-party tickets</a:t>
-            </a:r>
-          </a:p>
-          <a:p>
-            <a:pPr marL="285750" indent="-285750">
-              <a:buFont typeface="Wingdings" panose="05000000000000000000" pitchFamily="2" charset="2"/>
-              <a:buChar char="§"/>
-            </a:pPr>
-            <a:r>
-              <a:rPr lang="en-US" sz="2000" dirty="0">
-                <a:latin typeface="Franklin Gothic Medium Cond" panose="020B0606030402020204" pitchFamily="34" charset="0"/>
-              </a:rPr>
-              <a:t> The number of split ticket Counties has drastically decreased since the mid-2000’s when a majority of Counties were splitting their tickets; over the past few election cycles only a handful of Tennessee’s 95 Counties have split their ticket in any way, and with few exceptions County Margin Ranges have steadily decreased</a:t>
-            </a:r>
-          </a:p>
-          <a:p>
-            <a:pPr marL="285750" indent="-285750">
-              <a:buFont typeface="Wingdings" panose="05000000000000000000" pitchFamily="2" charset="2"/>
-              <a:buChar char="§"/>
-            </a:pPr>
-            <a:r>
-              <a:rPr lang="en-US" sz="2000" dirty="0">
-                <a:latin typeface="Franklin Gothic Medium Cond" panose="020B0606030402020204" pitchFamily="34" charset="0"/>
-              </a:rPr>
-              <a:t>How a County votes for one office is an increasingly strong indicator of how they will vote for other offices; Tennessee State House Elections are the most likely office to see split ticket voting</a:t>
-            </a:r>
-          </a:p>
-          <a:p>
-            <a:pPr marL="285750" indent="-285750">
-              <a:buFont typeface="Wingdings" panose="05000000000000000000" pitchFamily="2" charset="2"/>
-              <a:buChar char="§"/>
-            </a:pPr>
-            <a:r>
-              <a:rPr lang="en-US" sz="2000" dirty="0">
-                <a:latin typeface="Franklin Gothic Medium Cond" panose="020B0606030402020204" pitchFamily="34" charset="0"/>
-              </a:rPr>
-              <a:t>There doesn’t appear to be any strong correlation between the specific demographic groups I analyzed and their propensity to split their ticket; across the board, Tennessee voters appear to have become significantly more polarized and less likely to split their tickets in any form or fashion</a:t>
-            </a:r>
-          </a:p>
-          <a:p>
-            <a:pPr marL="285750" indent="-285750">
-              <a:buFont typeface="Wingdings" panose="05000000000000000000" pitchFamily="2" charset="2"/>
-              <a:buChar char="§"/>
-            </a:pPr>
-            <a:endParaRPr lang="en-US" dirty="0">
-              <a:latin typeface="Franklin Gothic Medium Cond" panose="020B0606030402020204" pitchFamily="34" charset="0"/>
-            </a:endParaRPr>
-          </a:p>
-        </p:txBody>
-      </p:sp>
+          <a:ln w="28575">
+            <a:solidFill>
+              <a:schemeClr val="tx1">
+                <a:lumMod val="95000"/>
+                <a:lumOff val="5000"/>
+              </a:schemeClr>
+            </a:solidFill>
+          </a:ln>
+          <a:effectLst>
+            <a:outerShdw blurRad="50800" dist="38100" dir="2700000" algn="tl" rotWithShape="0">
+              <a:prstClr val="black">
+                <a:alpha val="40000"/>
+              </a:prstClr>
+            </a:outerShdw>
+          </a:effectLst>
+        </p:spPr>
+      </p:pic>
     </p:spTree>
     <p:extLst>
       <p:ext uri="{BB962C8B-B14F-4D97-AF65-F5344CB8AC3E}">
-        <p14:creationId xmlns:p14="http://schemas.microsoft.com/office/powerpoint/2010/main" val="1942282229"/>
+        <p14:creationId xmlns:p14="http://schemas.microsoft.com/office/powerpoint/2010/main" val="1659882562"/>
       </p:ext>
     </p:extLst>
   </p:cSld>
@@ -8674,10 +8767,10 @@
       </p:grpSpPr>
       <p:sp>
         <p:nvSpPr>
-          <p:cNvPr id="6" name="Rectangle 5">
+          <p:cNvPr id="5" name="Rectangle 4">
             <a:extLst>
               <a:ext uri="{FF2B5EF4-FFF2-40B4-BE49-F238E27FC236}">
-                <a16:creationId xmlns:a16="http://schemas.microsoft.com/office/drawing/2014/main" id="{C2393626-4206-4642-8037-B969D1FA2F9C}"/>
+                <a16:creationId xmlns:a16="http://schemas.microsoft.com/office/drawing/2014/main" id="{84B400C4-BB0F-4859-AF5B-FB1A9B99FB98}"/>
               </a:ext>
             </a:extLst>
           </p:cNvPr>
@@ -8687,7 +8780,7 @@
         <p:spPr>
           <a:xfrm>
             <a:off x="-1" y="-1"/>
-            <a:ext cx="12192001" cy="995882"/>
+            <a:ext cx="12192001" cy="1032096"/>
           </a:xfrm>
           <a:prstGeom prst="rect">
             <a:avLst/>
@@ -8695,6 +8788,263 @@
           <a:gradFill flip="none" rotWithShape="1">
             <a:gsLst>
               <a:gs pos="54000">
+                <a:schemeClr val="accent4">
+                  <a:lumMod val="67000"/>
+                </a:schemeClr>
+              </a:gs>
+              <a:gs pos="91000">
+                <a:schemeClr val="accent4">
+                  <a:lumMod val="97000"/>
+                  <a:lumOff val="3000"/>
+                </a:schemeClr>
+              </a:gs>
+              <a:gs pos="100000">
+                <a:schemeClr val="accent4">
+                  <a:lumMod val="60000"/>
+                  <a:lumOff val="40000"/>
+                </a:schemeClr>
+              </a:gs>
+            </a:gsLst>
+            <a:lin ang="16200000" scaled="1"/>
+            <a:tileRect/>
+          </a:gradFill>
+          <a:ln>
+            <a:noFill/>
+          </a:ln>
+        </p:spPr>
+        <p:style>
+          <a:lnRef idx="2">
+            <a:schemeClr val="accent1">
+              <a:shade val="50000"/>
+            </a:schemeClr>
+          </a:lnRef>
+          <a:fillRef idx="1">
+            <a:schemeClr val="accent1"/>
+          </a:fillRef>
+          <a:effectRef idx="0">
+            <a:schemeClr val="accent1"/>
+          </a:effectRef>
+          <a:fontRef idx="minor">
+            <a:schemeClr val="lt1"/>
+          </a:fontRef>
+        </p:style>
+        <p:txBody>
+          <a:bodyPr rtlCol="0" anchor="ctr"/>
+          <a:lstStyle/>
+          <a:p>
+            <a:pPr algn="ctr"/>
+            <a:endParaRPr lang="en-US"/>
+          </a:p>
+        </p:txBody>
+      </p:sp>
+      <p:sp>
+        <p:nvSpPr>
+          <p:cNvPr id="6" name="TextBox 5">
+            <a:extLst>
+              <a:ext uri="{FF2B5EF4-FFF2-40B4-BE49-F238E27FC236}">
+                <a16:creationId xmlns:a16="http://schemas.microsoft.com/office/drawing/2014/main" id="{A697A704-88B5-4EF9-B920-4074EEEE0DC3}"/>
+              </a:ext>
+            </a:extLst>
+          </p:cNvPr>
+          <p:cNvSpPr txBox="1"/>
+          <p:nvPr/>
+        </p:nvSpPr>
+        <p:spPr>
+          <a:xfrm>
+            <a:off x="2900124" y="162104"/>
+            <a:ext cx="6391747" cy="707886"/>
+          </a:xfrm>
+          <a:prstGeom prst="rect">
+            <a:avLst/>
+          </a:prstGeom>
+          <a:noFill/>
+        </p:spPr>
+        <p:txBody>
+          <a:bodyPr wrap="square" rtlCol="0">
+            <a:spAutoFit/>
+          </a:bodyPr>
+          <a:lstStyle/>
+          <a:p>
+            <a:pPr algn="ctr"/>
+            <a:r>
+              <a:rPr lang="en-US" sz="4000" b="1" dirty="0">
+                <a:solidFill>
+                  <a:schemeClr val="bg1"/>
+                </a:solidFill>
+                <a:effectLst>
+                  <a:outerShdw blurRad="38100" dist="38100" dir="2700000" algn="tl">
+                    <a:srgbClr val="000000">
+                      <a:alpha val="43137"/>
+                    </a:srgbClr>
+                  </a:outerShdw>
+                </a:effectLst>
+                <a:latin typeface="Franklin Gothic Medium Cond" panose="020B0606030402020204" pitchFamily="34" charset="0"/>
+              </a:rPr>
+              <a:t>Conclusions</a:t>
+            </a:r>
+            <a:endParaRPr lang="en-US" b="1" dirty="0">
+              <a:solidFill>
+                <a:schemeClr val="bg1"/>
+              </a:solidFill>
+              <a:effectLst>
+                <a:outerShdw blurRad="38100" dist="38100" dir="2700000" algn="tl">
+                  <a:srgbClr val="000000">
+                    <a:alpha val="43137"/>
+                  </a:srgbClr>
+                </a:outerShdw>
+              </a:effectLst>
+              <a:latin typeface="Franklin Gothic Medium Cond" panose="020B0606030402020204" pitchFamily="34" charset="0"/>
+            </a:endParaRPr>
+          </a:p>
+        </p:txBody>
+      </p:sp>
+      <p:sp>
+        <p:nvSpPr>
+          <p:cNvPr id="7" name="TextBox 6">
+            <a:extLst>
+              <a:ext uri="{FF2B5EF4-FFF2-40B4-BE49-F238E27FC236}">
+                <a16:creationId xmlns:a16="http://schemas.microsoft.com/office/drawing/2014/main" id="{676BD517-F580-4B20-B9E6-EC1D9601F1C0}"/>
+              </a:ext>
+            </a:extLst>
+          </p:cNvPr>
+          <p:cNvSpPr txBox="1"/>
+          <p:nvPr/>
+        </p:nvSpPr>
+        <p:spPr>
+          <a:xfrm>
+            <a:off x="533398" y="1404888"/>
+            <a:ext cx="11125198" cy="4801314"/>
+          </a:xfrm>
+          <a:prstGeom prst="rect">
+            <a:avLst/>
+          </a:prstGeom>
+          <a:noFill/>
+        </p:spPr>
+        <p:txBody>
+          <a:bodyPr wrap="square" rtlCol="0">
+            <a:spAutoFit/>
+          </a:bodyPr>
+          <a:lstStyle/>
+          <a:p>
+            <a:pPr marL="285750" indent="-285750">
+              <a:buFont typeface="Wingdings" panose="05000000000000000000" pitchFamily="2" charset="2"/>
+              <a:buChar char="§"/>
+            </a:pPr>
+            <a:r>
+              <a:rPr lang="en-US" sz="2400" dirty="0">
+                <a:latin typeface="Franklin Gothic Medium Cond" panose="020B0606030402020204" pitchFamily="34" charset="0"/>
+              </a:rPr>
+              <a:t>Tennessee hasn’t split its statewide vote in any way since 2008, and based on recent trends it appears unlikely that it will anytime soon; decreasing Statewide Margin Range indicates voters are  increasingly voting straight one-party tickets</a:t>
+            </a:r>
+          </a:p>
+          <a:p>
+            <a:pPr marL="285750" indent="-285750">
+              <a:buFont typeface="Wingdings" panose="05000000000000000000" pitchFamily="2" charset="2"/>
+              <a:buChar char="§"/>
+            </a:pPr>
+            <a:r>
+              <a:rPr lang="en-US" sz="2400" dirty="0">
+                <a:latin typeface="Franklin Gothic Medium Cond" panose="020B0606030402020204" pitchFamily="34" charset="0"/>
+              </a:rPr>
+              <a:t> The number of split ticket Counties has drastically decreased since the mid-2000’s, when a majority of Counties were splitting their tickets; over the past few election cycles only a handful of Tennessee’s 95 Counties have split their ticket in any way, and the median County Margin Range has steadily decreased</a:t>
+            </a:r>
+          </a:p>
+          <a:p>
+            <a:pPr marL="285750" indent="-285750">
+              <a:buFont typeface="Wingdings" panose="05000000000000000000" pitchFamily="2" charset="2"/>
+              <a:buChar char="§"/>
+            </a:pPr>
+            <a:r>
+              <a:rPr lang="en-US" sz="2400" dirty="0">
+                <a:latin typeface="Franklin Gothic Medium Cond" panose="020B0606030402020204" pitchFamily="34" charset="0"/>
+              </a:rPr>
+              <a:t>How a County votes for one office is an increasingly strong indicator of how they will vote for other offices; Tennessee State House Elections are the most likely office to see split ticket voting</a:t>
+            </a:r>
+          </a:p>
+          <a:p>
+            <a:pPr marL="285750" indent="-285750">
+              <a:buFont typeface="Wingdings" panose="05000000000000000000" pitchFamily="2" charset="2"/>
+              <a:buChar char="§"/>
+            </a:pPr>
+            <a:r>
+              <a:rPr lang="en-US" sz="2400" dirty="0">
+                <a:latin typeface="Franklin Gothic Medium Cond" panose="020B0606030402020204" pitchFamily="34" charset="0"/>
+              </a:rPr>
+              <a:t>The correlation between the specific demographic groups I analyzed and their propensity to split their ticket is minimal; across the board, Tennessee voters appear to have become much more polarized and less likely to split their tickets than in previous decades</a:t>
+            </a:r>
+          </a:p>
+          <a:p>
+            <a:pPr marL="285750" indent="-285750">
+              <a:buFont typeface="Wingdings" panose="05000000000000000000" pitchFamily="2" charset="2"/>
+              <a:buChar char="§"/>
+            </a:pPr>
+            <a:endParaRPr lang="en-US" dirty="0">
+              <a:latin typeface="Franklin Gothic Medium Cond" panose="020B0606030402020204" pitchFamily="34" charset="0"/>
+            </a:endParaRPr>
+          </a:p>
+        </p:txBody>
+      </p:sp>
+    </p:spTree>
+    <p:extLst>
+      <p:ext uri="{BB962C8B-B14F-4D97-AF65-F5344CB8AC3E}">
+        <p14:creationId xmlns:p14="http://schemas.microsoft.com/office/powerpoint/2010/main" val="1942282229"/>
+      </p:ext>
+    </p:extLst>
+  </p:cSld>
+  <p:clrMapOvr>
+    <a:masterClrMapping/>
+  </p:clrMapOvr>
+  <mc:AlternateContent xmlns:mc="http://schemas.openxmlformats.org/markup-compatibility/2006" xmlns:p14="http://schemas.microsoft.com/office/powerpoint/2010/main">
+    <mc:Choice Requires="p14">
+      <p:transition p14:dur="0" advTm="0"/>
+    </mc:Choice>
+    <mc:Fallback xmlns="">
+      <p:transition advTm="0"/>
+    </mc:Fallback>
+  </mc:AlternateContent>
+</p:sld>
+</file>
+
+<file path=ppt/slides/slide22.xml><?xml version="1.0" encoding="utf-8"?>
+<p:sld xmlns:a="http://schemas.openxmlformats.org/drawingml/2006/main" xmlns:r="http://schemas.openxmlformats.org/officeDocument/2006/relationships" xmlns:p="http://schemas.openxmlformats.org/presentationml/2006/main">
+  <p:cSld>
+    <p:spTree>
+      <p:nvGrpSpPr>
+        <p:cNvPr id="1" name=""/>
+        <p:cNvGrpSpPr/>
+        <p:nvPr/>
+      </p:nvGrpSpPr>
+      <p:grpSpPr>
+        <a:xfrm>
+          <a:off x="0" y="0"/>
+          <a:ext cx="0" cy="0"/>
+          <a:chOff x="0" y="0"/>
+          <a:chExt cx="0" cy="0"/>
+        </a:xfrm>
+      </p:grpSpPr>
+      <p:sp>
+        <p:nvSpPr>
+          <p:cNvPr id="6" name="Rectangle 5">
+            <a:extLst>
+              <a:ext uri="{FF2B5EF4-FFF2-40B4-BE49-F238E27FC236}">
+                <a16:creationId xmlns:a16="http://schemas.microsoft.com/office/drawing/2014/main" id="{C2393626-4206-4642-8037-B969D1FA2F9C}"/>
+              </a:ext>
+            </a:extLst>
+          </p:cNvPr>
+          <p:cNvSpPr/>
+          <p:nvPr/>
+        </p:nvSpPr>
+        <p:spPr>
+          <a:xfrm>
+            <a:off x="-1" y="-1"/>
+            <a:ext cx="12192001" cy="995882"/>
+          </a:xfrm>
+          <a:prstGeom prst="rect">
+            <a:avLst/>
+          </a:prstGeom>
+          <a:gradFill flip="none" rotWithShape="1">
+            <a:gsLst>
+              <a:gs pos="71000">
                 <a:schemeClr val="accent4">
                   <a:lumMod val="67000"/>
                 </a:schemeClr>
@@ -9121,7 +9471,7 @@
           </a:xfrm>
           <a:gradFill flip="none" rotWithShape="1">
             <a:gsLst>
-              <a:gs pos="0">
+              <a:gs pos="73000">
                 <a:schemeClr val="accent4">
                   <a:lumMod val="67000"/>
                 </a:schemeClr>
@@ -9422,11 +9772,34 @@
           </a:prstGeom>
           <a:noFill/>
           <a:ln w="76200">
-            <a:solidFill>
-              <a:schemeClr val="accent3">
-                <a:lumMod val="50000"/>
-              </a:schemeClr>
-            </a:solidFill>
+            <a:gradFill flip="none" rotWithShape="1">
+              <a:gsLst>
+                <a:gs pos="0">
+                  <a:schemeClr val="accent4">
+                    <a:lumMod val="89000"/>
+                  </a:schemeClr>
+                </a:gs>
+                <a:gs pos="23000">
+                  <a:schemeClr val="accent4">
+                    <a:lumMod val="89000"/>
+                  </a:schemeClr>
+                </a:gs>
+                <a:gs pos="69000">
+                  <a:schemeClr val="accent4">
+                    <a:lumMod val="75000"/>
+                  </a:schemeClr>
+                </a:gs>
+                <a:gs pos="97000">
+                  <a:schemeClr val="accent4">
+                    <a:lumMod val="70000"/>
+                  </a:schemeClr>
+                </a:gs>
+              </a:gsLst>
+              <a:path path="circle">
+                <a:fillToRect l="50000" t="50000" r="50000" b="50000"/>
+              </a:path>
+              <a:tileRect/>
+            </a:gradFill>
           </a:ln>
         </p:spPr>
         <p:style>
@@ -9723,18 +10096,18 @@
           </a:prstGeom>
           <a:gradFill flip="none" rotWithShape="1">
             <a:gsLst>
-              <a:gs pos="20000">
+              <a:gs pos="61000">
                 <a:schemeClr val="accent4">
                   <a:lumMod val="67000"/>
                 </a:schemeClr>
               </a:gs>
-              <a:gs pos="77000">
+              <a:gs pos="90000">
                 <a:schemeClr val="accent4">
                   <a:lumMod val="97000"/>
                   <a:lumOff val="3000"/>
                 </a:schemeClr>
               </a:gs>
-              <a:gs pos="92000">
+              <a:gs pos="99000">
                 <a:schemeClr val="accent4">
                   <a:lumMod val="60000"/>
                   <a:lumOff val="40000"/>
@@ -10307,20 +10680,20 @@
         </p:nvSpPr>
         <p:spPr>
           <a:xfrm>
-            <a:off x="9270750" y="-5192"/>
-            <a:ext cx="2921250" cy="1913813"/>
+            <a:off x="9270749" y="255265"/>
+            <a:ext cx="2921250" cy="1168933"/>
           </a:xfrm>
           <a:prstGeom prst="rect">
             <a:avLst/>
           </a:prstGeom>
           <a:gradFill flip="none" rotWithShape="1">
             <a:gsLst>
-              <a:gs pos="0">
+              <a:gs pos="49000">
                 <a:schemeClr val="accent4">
                   <a:lumMod val="67000"/>
                 </a:schemeClr>
               </a:gs>
-              <a:gs pos="48000">
+              <a:gs pos="77000">
                 <a:schemeClr val="accent4">
                   <a:lumMod val="97000"/>
                   <a:lumOff val="3000"/>
@@ -10379,7 +10752,7 @@
         </p:nvSpPr>
         <p:spPr>
           <a:xfrm>
-            <a:off x="9974655" y="464618"/>
+            <a:off x="9974655" y="424232"/>
             <a:ext cx="1513438" cy="830997"/>
           </a:xfrm>
           <a:prstGeom prst="rect">
@@ -10453,6 +10826,13 @@
               <a:schemeClr val="tx1"/>
             </a:solidFill>
           </a:ln>
+          <a:effectLst>
+            <a:outerShdw blurRad="50800" dist="38100" dir="2700000" algn="tl" rotWithShape="0">
+              <a:prstClr val="black">
+                <a:alpha val="40000"/>
+              </a:prstClr>
+            </a:outerShdw>
+          </a:effectLst>
         </p:spPr>
         <p:txBody>
           <a:bodyPr wrap="square">
@@ -10533,12 +10913,12 @@
       <p:bgPr>
         <a:gradFill flip="none" rotWithShape="1">
           <a:gsLst>
-            <a:gs pos="0">
+            <a:gs pos="62000">
               <a:schemeClr val="accent4">
                 <a:lumMod val="67000"/>
               </a:schemeClr>
             </a:gs>
-            <a:gs pos="48000">
+            <a:gs pos="88000">
               <a:schemeClr val="accent4">
                 <a:lumMod val="97000"/>
                 <a:lumOff val="3000"/>
@@ -10589,13 +10969,13 @@
         </p:nvSpPr>
         <p:spPr>
           <a:xfrm>
-            <a:off x="838200" y="2665282"/>
-            <a:ext cx="10515600" cy="1527435"/>
+            <a:off x="1555687" y="2405476"/>
+            <a:ext cx="9080626" cy="2047045"/>
           </a:xfrm>
         </p:spPr>
         <p:txBody>
           <a:bodyPr>
-            <a:normAutofit fontScale="92500"/>
+            <a:normAutofit/>
           </a:bodyPr>
           <a:lstStyle/>
           <a:p>
@@ -10603,7 +10983,7 @@
               <a:buNone/>
             </a:pPr>
             <a:r>
-              <a:rPr lang="en-US" sz="4800" b="1" dirty="0">
+              <a:rPr lang="en-US" sz="4000" b="1" dirty="0">
                 <a:solidFill>
                   <a:schemeClr val="bg1"/>
                 </a:solidFill>
@@ -10616,8 +10996,102 @@
                 </a:effectLst>
                 <a:latin typeface="Franklin Gothic Medium Cond" panose="020B0606030402020204" pitchFamily="34" charset="0"/>
               </a:rPr>
-              <a:t>What are the statewide trends in Ticket Splitting in Tennessee elections over the past 40 years?</a:t>
-            </a:r>
+              <a:t>What are the statewide trends in </a:t>
+            </a:r>
+          </a:p>
+          <a:p>
+            <a:pPr marL="0" indent="0" algn="ctr">
+              <a:buNone/>
+            </a:pPr>
+            <a:r>
+              <a:rPr lang="en-US" sz="4000" b="1" dirty="0">
+                <a:solidFill>
+                  <a:schemeClr val="bg1"/>
+                </a:solidFill>
+                <a:effectLst>
+                  <a:outerShdw blurRad="38100" dist="38100" dir="2700000" algn="tl">
+                    <a:srgbClr val="000000">
+                      <a:alpha val="43137"/>
+                    </a:srgbClr>
+                  </a:outerShdw>
+                </a:effectLst>
+                <a:latin typeface="Franklin Gothic Medium Cond" panose="020B0606030402020204" pitchFamily="34" charset="0"/>
+              </a:rPr>
+              <a:t>Ticket Splitting in Tennessee elections </a:t>
+            </a:r>
+          </a:p>
+          <a:p>
+            <a:pPr marL="0" indent="0" algn="ctr">
+              <a:buNone/>
+            </a:pPr>
+            <a:r>
+              <a:rPr lang="en-US" sz="4000" b="1" dirty="0">
+                <a:solidFill>
+                  <a:schemeClr val="bg1"/>
+                </a:solidFill>
+                <a:effectLst>
+                  <a:outerShdw blurRad="38100" dist="38100" dir="2700000" algn="tl">
+                    <a:srgbClr val="000000">
+                      <a:alpha val="43137"/>
+                    </a:srgbClr>
+                  </a:outerShdw>
+                </a:effectLst>
+                <a:latin typeface="Franklin Gothic Medium Cond" panose="020B0606030402020204" pitchFamily="34" charset="0"/>
+              </a:rPr>
+              <a:t>over the past 40 years?</a:t>
+            </a:r>
+          </a:p>
+        </p:txBody>
+      </p:sp>
+      <p:sp>
+        <p:nvSpPr>
+          <p:cNvPr id="4" name="Rectangle 3">
+            <a:extLst>
+              <a:ext uri="{FF2B5EF4-FFF2-40B4-BE49-F238E27FC236}">
+                <a16:creationId xmlns:a16="http://schemas.microsoft.com/office/drawing/2014/main" id="{CBDB6392-6C08-4769-9083-FF30103702CB}"/>
+              </a:ext>
+            </a:extLst>
+          </p:cNvPr>
+          <p:cNvSpPr/>
+          <p:nvPr/>
+        </p:nvSpPr>
+        <p:spPr>
+          <a:xfrm>
+            <a:off x="1275030" y="1717894"/>
+            <a:ext cx="9641940" cy="3422210"/>
+          </a:xfrm>
+          <a:prstGeom prst="rect">
+            <a:avLst/>
+          </a:prstGeom>
+          <a:noFill/>
+          <a:ln w="28575">
+            <a:solidFill>
+              <a:schemeClr val="bg1"/>
+            </a:solidFill>
+          </a:ln>
+        </p:spPr>
+        <p:style>
+          <a:lnRef idx="2">
+            <a:schemeClr val="accent1">
+              <a:shade val="50000"/>
+            </a:schemeClr>
+          </a:lnRef>
+          <a:fillRef idx="1">
+            <a:schemeClr val="accent1"/>
+          </a:fillRef>
+          <a:effectRef idx="0">
+            <a:schemeClr val="accent1"/>
+          </a:effectRef>
+          <a:fontRef idx="minor">
+            <a:schemeClr val="lt1"/>
+          </a:fontRef>
+        </p:style>
+        <p:txBody>
+          <a:bodyPr rtlCol="0" anchor="ctr"/>
+          <a:lstStyle/>
+          <a:p>
+            <a:pPr algn="ctr"/>
+            <a:endParaRPr lang="en-US"/>
           </a:p>
         </p:txBody>
       </p:sp>
@@ -10631,13 +11105,13 @@
   <p:clrMapOvr>
     <a:masterClrMapping/>
   </p:clrMapOvr>
-  <mc:AlternateContent xmlns:mc="http://schemas.openxmlformats.org/markup-compatibility/2006">
-    <mc:Choice xmlns:p14="http://schemas.microsoft.com/office/powerpoint/2010/main" Requires="p14">
+  <mc:AlternateContent xmlns:mc="http://schemas.openxmlformats.org/markup-compatibility/2006" xmlns:p14="http://schemas.microsoft.com/office/powerpoint/2010/main">
+    <mc:Choice Requires="p14">
       <p:transition spd="slow" p14:dur="1500" advTm="0">
         <p:random/>
       </p:transition>
     </mc:Choice>
-    <mc:Fallback>
+    <mc:Fallback xmlns="">
       <p:transition spd="slow" advTm="0">
         <p:random/>
       </p:transition>
@@ -10649,6 +11123,41 @@
 <file path=ppt/slides/slide7.xml><?xml version="1.0" encoding="utf-8"?>
 <p:sld xmlns:a="http://schemas.openxmlformats.org/drawingml/2006/main" xmlns:r="http://schemas.openxmlformats.org/officeDocument/2006/relationships" xmlns:p="http://schemas.openxmlformats.org/presentationml/2006/main">
   <p:cSld>
+    <p:bg>
+      <p:bgPr>
+        <a:gradFill flip="none" rotWithShape="1">
+          <a:gsLst>
+            <a:gs pos="0">
+              <a:schemeClr val="accent4">
+                <a:lumMod val="5000"/>
+                <a:lumOff val="95000"/>
+              </a:schemeClr>
+            </a:gs>
+            <a:gs pos="75000">
+              <a:schemeClr val="accent4">
+                <a:lumMod val="45000"/>
+                <a:lumOff val="55000"/>
+              </a:schemeClr>
+            </a:gs>
+            <a:gs pos="87000">
+              <a:schemeClr val="accent4">
+                <a:lumMod val="45000"/>
+                <a:lumOff val="55000"/>
+              </a:schemeClr>
+            </a:gs>
+            <a:gs pos="100000">
+              <a:schemeClr val="accent4">
+                <a:lumMod val="30000"/>
+                <a:lumOff val="70000"/>
+              </a:schemeClr>
+            </a:gs>
+          </a:gsLst>
+          <a:lin ang="5400000" scaled="1"/>
+          <a:tileRect/>
+        </a:gradFill>
+        <a:effectLst/>
+      </p:bgPr>
+    </p:bg>
     <p:spTree>
       <p:nvGrpSpPr>
         <p:cNvPr id="1" name=""/>
@@ -10787,19 +11296,19 @@
           </a:prstGeom>
           <a:gradFill flip="none" rotWithShape="1">
             <a:gsLst>
-              <a:gs pos="7000">
+              <a:gs pos="98000">
                 <a:schemeClr val="accent4">
                   <a:lumMod val="40000"/>
                   <a:lumOff val="60000"/>
                 </a:schemeClr>
               </a:gs>
-              <a:gs pos="32000">
+              <a:gs pos="83000">
                 <a:schemeClr val="accent4">
                   <a:lumMod val="95000"/>
                   <a:lumOff val="5000"/>
                 </a:schemeClr>
               </a:gs>
-              <a:gs pos="88000">
+              <a:gs pos="70000">
                 <a:schemeClr val="accent4">
                   <a:lumMod val="60000"/>
                 </a:schemeClr>
@@ -11143,18 +11652,18 @@
           </a:prstGeom>
           <a:gradFill flip="none" rotWithShape="1">
             <a:gsLst>
-              <a:gs pos="45000">
+              <a:gs pos="64000">
                 <a:schemeClr val="accent4">
                   <a:lumMod val="67000"/>
                 </a:schemeClr>
               </a:gs>
-              <a:gs pos="81000">
+              <a:gs pos="82000">
                 <a:schemeClr val="accent4">
                   <a:lumMod val="97000"/>
                   <a:lumOff val="3000"/>
                 </a:schemeClr>
               </a:gs>
-              <a:gs pos="91000">
+              <a:gs pos="96000">
                 <a:schemeClr val="accent4">
                   <a:lumMod val="60000"/>
                   <a:lumOff val="40000"/>
@@ -11553,11 +12062,11 @@
   <p:clrMapOvr>
     <a:masterClrMapping/>
   </p:clrMapOvr>
-  <mc:AlternateContent xmlns:mc="http://schemas.openxmlformats.org/markup-compatibility/2006">
-    <mc:Choice xmlns:p14="http://schemas.microsoft.com/office/powerpoint/2010/main" Requires="p14">
+  <mc:AlternateContent xmlns:mc="http://schemas.openxmlformats.org/markup-compatibility/2006" xmlns:p14="http://schemas.microsoft.com/office/powerpoint/2010/main">
+    <mc:Choice Requires="p14">
       <p:transition p14:dur="0"/>
     </mc:Choice>
-    <mc:Fallback>
+    <mc:Fallback xmlns="">
       <p:transition/>
     </mc:Fallback>
   </mc:AlternateContent>
@@ -12016,12 +12525,12 @@
           </a:prstGeom>
           <a:gradFill flip="none" rotWithShape="1">
             <a:gsLst>
-              <a:gs pos="57000">
+              <a:gs pos="69000">
                 <a:schemeClr val="accent4">
                   <a:lumMod val="67000"/>
                 </a:schemeClr>
               </a:gs>
-              <a:gs pos="80000">
+              <a:gs pos="83000">
                 <a:schemeClr val="accent4">
                   <a:lumMod val="97000"/>
                   <a:lumOff val="3000"/>

</xml_diff>